<commit_message>
Fixes missing automatic date updates for the German PPTX template
On some of the master slides, the automatic updates for the date within the footer were disabled.
</commit_message>
<xml_diff>
--- a/es_template_de.pptx
+++ b/es_template_de.pptx
@@ -302,7 +302,7 @@
               <a:pPr>
                 <a:defRPr/>
               </a:pPr>
-              <a:t>17. September 2024</a:t>
+              <a:t>6. November 2024</a:t>
             </a:fld>
             <a:endParaRPr lang="de-DE"/>
           </a:p>
@@ -931,7 +931,7 @@
               <a:pPr>
                 <a:defRPr/>
               </a:pPr>
-              <a:t>17. September 2024</a:t>
+              <a:t>6. November 2024</a:t>
             </a:fld>
             <a:endParaRPr lang="de-DE"/>
           </a:p>
@@ -1878,7 +1878,7 @@
               <a:pPr>
                 <a:defRPr/>
               </a:pPr>
-              <a:t>17. September 2024</a:t>
+              <a:t>6. November 2024</a:t>
             </a:fld>
             <a:endParaRPr lang="de-DE"/>
           </a:p>
@@ -3334,7 +3334,19 @@
               <a:rPr lang="de-DE" altLang="de-DE" sz="1000" dirty="0">
                 <a:cs typeface="Tahoma" panose="020B0604030504040204" pitchFamily="34" charset="0"/>
               </a:rPr>
-              <a:t>  |  17.09.2024  |  Fachbereich Elektrotechnik und Informationstechnik  |  Fachgebiet Echtzeitsysteme  |  Prof. Schürr</a:t>
+              <a:t>  |  </a:t>
+            </a:r>
+            <a:fld id="{AF60E3AC-6AF5-49EE-A62E-6CE4E76376F3}" type="datetime1">
+              <a:rPr lang="de-DE" altLang="de-DE" sz="1000" smtClean="0">
+                <a:cs typeface="Tahoma" panose="020B0604030504040204" pitchFamily="34" charset="0"/>
+              </a:rPr>
+              <a:t>06.11.2024</a:t>
+            </a:fld>
+            <a:r>
+              <a:rPr lang="de-DE" altLang="de-DE" sz="1000" dirty="0">
+                <a:cs typeface="Tahoma" panose="020B0604030504040204" pitchFamily="34" charset="0"/>
+              </a:rPr>
+              <a:t>  |  Fachbereich Elektrotechnik und Informationstechnik  |  Fachgebiet Echtzeitsysteme  |  Prof. Schürr</a:t>
             </a:r>
           </a:p>
           <a:p>
@@ -5283,7 +5295,19 @@
               <a:rPr lang="de-DE" altLang="de-DE" sz="1000" dirty="0">
                 <a:cs typeface="Tahoma" panose="020B0604030504040204" pitchFamily="34" charset="0"/>
               </a:rPr>
-              <a:t>  |  17.09.2024  |  Fachbereich Elektrotechnik und Informationstechnik  |  Fachgebiet Echtzeitsysteme  |  Prof. Schürr</a:t>
+              <a:t>  |  </a:t>
+            </a:r>
+            <a:fld id="{D4B4143A-7FB5-4CF7-8FB9-4CE1A216C2FA}" type="datetime1">
+              <a:rPr lang="de-DE" altLang="de-DE" sz="1000" smtClean="0">
+                <a:cs typeface="Tahoma" panose="020B0604030504040204" pitchFamily="34" charset="0"/>
+              </a:rPr>
+              <a:t>06.11.2024</a:t>
+            </a:fld>
+            <a:r>
+              <a:rPr lang="de-DE" altLang="de-DE" sz="1000" dirty="0">
+                <a:cs typeface="Tahoma" panose="020B0604030504040204" pitchFamily="34" charset="0"/>
+              </a:rPr>
+              <a:t>  |  Fachbereich Elektrotechnik und Informationstechnik  |  Fachgebiet Echtzeitsysteme  |  Prof. Schürr</a:t>
             </a:r>
           </a:p>
           <a:p>
@@ -5920,6 +5944,22 @@
       </a:lvl9pPr>
     </p:otherStyle>
   </p:txStyles>
+  <p:extLst>
+    <p:ext uri="{27BBF7A9-308A-43DC-89C8-2F10F3537804}">
+      <p15:sldGuideLst xmlns:p15="http://schemas.microsoft.com/office/powerpoint/2012/main">
+        <p15:guide id="1" orient="horz" pos="1620" userDrawn="1">
+          <p15:clr>
+            <a:srgbClr val="F26B43"/>
+          </p15:clr>
+        </p15:guide>
+        <p15:guide id="2" pos="2880" userDrawn="1">
+          <p15:clr>
+            <a:srgbClr val="F26B43"/>
+          </p15:clr>
+        </p15:guide>
+      </p15:sldGuideLst>
+    </p:ext>
+  </p:extLst>
 </p:sldMaster>
 </file>
 

</xml_diff>